<commit_message>
new client open account
</commit_message>
<xml_diff>
--- a/Presentation Template.pptx
+++ b/Presentation Template.pptx
@@ -764,7 +764,7 @@
           <a:p>
             <a:fld id="{0FA23B7F-B0A4-4548-866A-1C343862BBF1}" type="datetimeFigureOut">
               <a:rPr lang="en-US" smtClean="0"/>
-              <a:t>11/24/23</a:t>
+              <a:t>11/28/23</a:t>
             </a:fld>
             <a:endParaRPr lang="en-CA"/>
           </a:p>
@@ -930,7 +930,7 @@
           <a:p>
             <a:fld id="{7466FCE3-F006-44F4-AB45-D076B47EC6C4}" type="datetimeFigureOut">
               <a:rPr lang="en-US" smtClean="0"/>
-              <a:t>11/24/23</a:t>
+              <a:t>11/28/23</a:t>
             </a:fld>
             <a:endParaRPr lang="en-US"/>
           </a:p>
@@ -3297,10 +3297,9 @@
           </a:p>
           <a:p>
             <a:r>
-              <a:rPr lang="en-CA"/>
+              <a:rPr lang="en-CA" dirty="0"/>
               <a:t>Alan Zhang </a:t>
             </a:r>
-            <a:endParaRPr lang="en-CA" dirty="0"/>
           </a:p>
         </p:txBody>
       </p:sp>
@@ -3325,6 +3324,571 @@
               <a:t>1</a:t>
             </a:fld>
             <a:endParaRPr lang="en-US"/>
+          </a:p>
+        </p:txBody>
+      </p:sp>
+      <p:sp>
+        <p:nvSpPr>
+          <p:cNvPr id="2" name="Rectangle 1">
+            <a:extLst>
+              <a:ext uri="{FF2B5EF4-FFF2-40B4-BE49-F238E27FC236}">
+                <a16:creationId xmlns:a16="http://schemas.microsoft.com/office/drawing/2014/main" id="{80ECBB7A-3A84-4F47-AEF9-9ADC4FD0C4CB}"/>
+              </a:ext>
+            </a:extLst>
+          </p:cNvPr>
+          <p:cNvSpPr/>
+          <p:nvPr/>
+        </p:nvSpPr>
+        <p:spPr>
+          <a:xfrm>
+            <a:off x="7772400" y="1143000"/>
+            <a:ext cx="1752600" cy="762000"/>
+          </a:xfrm>
+          <a:prstGeom prst="rect">
+            <a:avLst/>
+          </a:prstGeom>
+          <a:solidFill>
+            <a:schemeClr val="bg1"/>
+          </a:solidFill>
+          <a:ln>
+            <a:solidFill>
+              <a:schemeClr val="tx1"/>
+            </a:solidFill>
+          </a:ln>
+          <a:effectLst/>
+        </p:spPr>
+        <p:style>
+          <a:lnRef idx="1">
+            <a:schemeClr val="accent1"/>
+          </a:lnRef>
+          <a:fillRef idx="3">
+            <a:schemeClr val="accent1"/>
+          </a:fillRef>
+          <a:effectRef idx="2">
+            <a:schemeClr val="accent1"/>
+          </a:effectRef>
+          <a:fontRef idx="minor">
+            <a:schemeClr val="lt1"/>
+          </a:fontRef>
+        </p:style>
+        <p:txBody>
+          <a:bodyPr rtlCol="0" anchor="ctr"/>
+          <a:lstStyle/>
+          <a:p>
+            <a:pPr algn="ctr"/>
+            <a:r>
+              <a:rPr lang="en-US" dirty="0">
+                <a:solidFill>
+                  <a:schemeClr val="tx1"/>
+                </a:solidFill>
+                <a:latin typeface="Open Sans"/>
+                <a:cs typeface="Open Sans"/>
+              </a:rPr>
+              <a:t>Package</a:t>
+            </a:r>
+          </a:p>
+        </p:txBody>
+      </p:sp>
+      <p:sp>
+        <p:nvSpPr>
+          <p:cNvPr id="3" name="Rectangle 2">
+            <a:extLst>
+              <a:ext uri="{FF2B5EF4-FFF2-40B4-BE49-F238E27FC236}">
+                <a16:creationId xmlns:a16="http://schemas.microsoft.com/office/drawing/2014/main" id="{B98AD32F-06FE-2040-8BFB-85D60390ED04}"/>
+              </a:ext>
+            </a:extLst>
+          </p:cNvPr>
+          <p:cNvSpPr/>
+          <p:nvPr/>
+        </p:nvSpPr>
+        <p:spPr>
+          <a:xfrm>
+            <a:off x="6324600" y="2514600"/>
+            <a:ext cx="1600200" cy="609600"/>
+          </a:xfrm>
+          <a:prstGeom prst="rect">
+            <a:avLst/>
+          </a:prstGeom>
+          <a:solidFill>
+            <a:schemeClr val="bg1"/>
+          </a:solidFill>
+          <a:ln>
+            <a:solidFill>
+              <a:schemeClr val="tx1"/>
+            </a:solidFill>
+          </a:ln>
+          <a:effectLst/>
+        </p:spPr>
+        <p:style>
+          <a:lnRef idx="1">
+            <a:schemeClr val="accent1"/>
+          </a:lnRef>
+          <a:fillRef idx="3">
+            <a:schemeClr val="accent1"/>
+          </a:fillRef>
+          <a:effectRef idx="2">
+            <a:schemeClr val="accent1"/>
+          </a:effectRef>
+          <a:fontRef idx="minor">
+            <a:schemeClr val="lt1"/>
+          </a:fontRef>
+        </p:style>
+        <p:txBody>
+          <a:bodyPr rtlCol="0" anchor="ctr"/>
+          <a:lstStyle/>
+          <a:p>
+            <a:pPr algn="ctr"/>
+            <a:r>
+              <a:rPr lang="en-US" dirty="0">
+                <a:solidFill>
+                  <a:schemeClr val="tx1"/>
+                </a:solidFill>
+                <a:latin typeface="Open Sans"/>
+                <a:cs typeface="Open Sans"/>
+              </a:rPr>
+              <a:t>User</a:t>
+            </a:r>
+          </a:p>
+        </p:txBody>
+      </p:sp>
+      <p:sp>
+        <p:nvSpPr>
+          <p:cNvPr id="7" name="Rectangle 6">
+            <a:extLst>
+              <a:ext uri="{FF2B5EF4-FFF2-40B4-BE49-F238E27FC236}">
+                <a16:creationId xmlns:a16="http://schemas.microsoft.com/office/drawing/2014/main" id="{858483BB-D9E8-4B4F-A83D-E16DE0CFE5F8}"/>
+              </a:ext>
+            </a:extLst>
+          </p:cNvPr>
+          <p:cNvSpPr/>
+          <p:nvPr/>
+        </p:nvSpPr>
+        <p:spPr>
+          <a:xfrm>
+            <a:off x="9372600" y="2514600"/>
+            <a:ext cx="1600200" cy="609600"/>
+          </a:xfrm>
+          <a:prstGeom prst="rect">
+            <a:avLst/>
+          </a:prstGeom>
+          <a:solidFill>
+            <a:schemeClr val="bg1"/>
+          </a:solidFill>
+          <a:ln>
+            <a:solidFill>
+              <a:schemeClr val="tx1"/>
+            </a:solidFill>
+          </a:ln>
+          <a:effectLst/>
+        </p:spPr>
+        <p:style>
+          <a:lnRef idx="1">
+            <a:schemeClr val="accent1"/>
+          </a:lnRef>
+          <a:fillRef idx="3">
+            <a:schemeClr val="accent1"/>
+          </a:fillRef>
+          <a:effectRef idx="2">
+            <a:schemeClr val="accent1"/>
+          </a:effectRef>
+          <a:fontRef idx="minor">
+            <a:schemeClr val="lt1"/>
+          </a:fontRef>
+        </p:style>
+        <p:txBody>
+          <a:bodyPr rtlCol="0" anchor="ctr"/>
+          <a:lstStyle/>
+          <a:p>
+            <a:pPr algn="ctr"/>
+            <a:r>
+              <a:rPr lang="en-US" dirty="0">
+                <a:solidFill>
+                  <a:schemeClr val="tx1"/>
+                </a:solidFill>
+                <a:latin typeface="Open Sans"/>
+                <a:cs typeface="Open Sans"/>
+              </a:rPr>
+              <a:t>Investment</a:t>
+            </a:r>
+          </a:p>
+        </p:txBody>
+      </p:sp>
+      <p:sp>
+        <p:nvSpPr>
+          <p:cNvPr id="5" name="Rectangle 4">
+            <a:extLst>
+              <a:ext uri="{FF2B5EF4-FFF2-40B4-BE49-F238E27FC236}">
+                <a16:creationId xmlns:a16="http://schemas.microsoft.com/office/drawing/2014/main" id="{A007A23A-028E-AC4E-A55E-D611CFD2B588}"/>
+              </a:ext>
+            </a:extLst>
+          </p:cNvPr>
+          <p:cNvSpPr/>
+          <p:nvPr/>
+        </p:nvSpPr>
+        <p:spPr>
+          <a:xfrm>
+            <a:off x="5626535" y="3962400"/>
+            <a:ext cx="1295400" cy="533400"/>
+          </a:xfrm>
+          <a:prstGeom prst="rect">
+            <a:avLst/>
+          </a:prstGeom>
+          <a:solidFill>
+            <a:schemeClr val="bg1"/>
+          </a:solidFill>
+          <a:ln>
+            <a:solidFill>
+              <a:schemeClr val="tx1"/>
+            </a:solidFill>
+          </a:ln>
+          <a:effectLst/>
+        </p:spPr>
+        <p:style>
+          <a:lnRef idx="1">
+            <a:schemeClr val="accent1"/>
+          </a:lnRef>
+          <a:fillRef idx="3">
+            <a:schemeClr val="accent1"/>
+          </a:fillRef>
+          <a:effectRef idx="2">
+            <a:schemeClr val="accent1"/>
+          </a:effectRef>
+          <a:fontRef idx="minor">
+            <a:schemeClr val="lt1"/>
+          </a:fontRef>
+        </p:style>
+        <p:txBody>
+          <a:bodyPr rtlCol="0" anchor="ctr"/>
+          <a:lstStyle/>
+          <a:p>
+            <a:pPr algn="ctr"/>
+            <a:r>
+              <a:rPr lang="en-US" dirty="0">
+                <a:solidFill>
+                  <a:schemeClr val="tx1"/>
+                </a:solidFill>
+                <a:latin typeface="Open Sans"/>
+                <a:cs typeface="Open Sans"/>
+              </a:rPr>
+              <a:t>Client</a:t>
+            </a:r>
+          </a:p>
+        </p:txBody>
+      </p:sp>
+      <p:sp>
+        <p:nvSpPr>
+          <p:cNvPr id="9" name="Rectangle 8">
+            <a:extLst>
+              <a:ext uri="{FF2B5EF4-FFF2-40B4-BE49-F238E27FC236}">
+                <a16:creationId xmlns:a16="http://schemas.microsoft.com/office/drawing/2014/main" id="{50191F6B-494D-2549-AAA4-F1EABCA4DACC}"/>
+              </a:ext>
+            </a:extLst>
+          </p:cNvPr>
+          <p:cNvSpPr/>
+          <p:nvPr/>
+        </p:nvSpPr>
+        <p:spPr>
+          <a:xfrm>
+            <a:off x="7277100" y="3962400"/>
+            <a:ext cx="1295400" cy="533400"/>
+          </a:xfrm>
+          <a:prstGeom prst="rect">
+            <a:avLst/>
+          </a:prstGeom>
+          <a:solidFill>
+            <a:schemeClr val="bg1"/>
+          </a:solidFill>
+          <a:ln>
+            <a:solidFill>
+              <a:schemeClr val="tx1"/>
+            </a:solidFill>
+          </a:ln>
+          <a:effectLst/>
+        </p:spPr>
+        <p:style>
+          <a:lnRef idx="1">
+            <a:schemeClr val="accent1"/>
+          </a:lnRef>
+          <a:fillRef idx="3">
+            <a:schemeClr val="accent1"/>
+          </a:fillRef>
+          <a:effectRef idx="2">
+            <a:schemeClr val="accent1"/>
+          </a:effectRef>
+          <a:fontRef idx="minor">
+            <a:schemeClr val="lt1"/>
+          </a:fontRef>
+        </p:style>
+        <p:txBody>
+          <a:bodyPr rtlCol="0" anchor="ctr"/>
+          <a:lstStyle/>
+          <a:p>
+            <a:pPr algn="ctr"/>
+            <a:r>
+              <a:rPr lang="en-US" dirty="0">
+                <a:solidFill>
+                  <a:schemeClr val="tx1"/>
+                </a:solidFill>
+                <a:latin typeface="Open Sans"/>
+                <a:cs typeface="Open Sans"/>
+              </a:rPr>
+              <a:t>Manager</a:t>
+            </a:r>
+          </a:p>
+        </p:txBody>
+      </p:sp>
+      <p:sp>
+        <p:nvSpPr>
+          <p:cNvPr id="10" name="Rectangle 9">
+            <a:extLst>
+              <a:ext uri="{FF2B5EF4-FFF2-40B4-BE49-F238E27FC236}">
+                <a16:creationId xmlns:a16="http://schemas.microsoft.com/office/drawing/2014/main" id="{41E97D8D-E12C-7E4B-93A4-299689EB0101}"/>
+              </a:ext>
+            </a:extLst>
+          </p:cNvPr>
+          <p:cNvSpPr/>
+          <p:nvPr/>
+        </p:nvSpPr>
+        <p:spPr>
+          <a:xfrm>
+            <a:off x="8707416" y="3968663"/>
+            <a:ext cx="1295400" cy="533400"/>
+          </a:xfrm>
+          <a:prstGeom prst="rect">
+            <a:avLst/>
+          </a:prstGeom>
+          <a:solidFill>
+            <a:schemeClr val="bg1"/>
+          </a:solidFill>
+          <a:ln>
+            <a:solidFill>
+              <a:schemeClr val="tx1"/>
+            </a:solidFill>
+          </a:ln>
+          <a:effectLst/>
+        </p:spPr>
+        <p:style>
+          <a:lnRef idx="1">
+            <a:schemeClr val="accent1"/>
+          </a:lnRef>
+          <a:fillRef idx="3">
+            <a:schemeClr val="accent1"/>
+          </a:fillRef>
+          <a:effectRef idx="2">
+            <a:schemeClr val="accent1"/>
+          </a:effectRef>
+          <a:fontRef idx="minor">
+            <a:schemeClr val="lt1"/>
+          </a:fontRef>
+        </p:style>
+        <p:txBody>
+          <a:bodyPr rtlCol="0" anchor="ctr"/>
+          <a:lstStyle/>
+          <a:p>
+            <a:pPr algn="ctr"/>
+            <a:r>
+              <a:rPr lang="en-US" dirty="0">
+                <a:solidFill>
+                  <a:schemeClr val="tx1"/>
+                </a:solidFill>
+                <a:latin typeface="Open Sans"/>
+                <a:cs typeface="Open Sans"/>
+              </a:rPr>
+              <a:t>Investment</a:t>
+            </a:r>
+          </a:p>
+        </p:txBody>
+      </p:sp>
+      <p:sp>
+        <p:nvSpPr>
+          <p:cNvPr id="11" name="Rectangle 10">
+            <a:extLst>
+              <a:ext uri="{FF2B5EF4-FFF2-40B4-BE49-F238E27FC236}">
+                <a16:creationId xmlns:a16="http://schemas.microsoft.com/office/drawing/2014/main" id="{A615B9C6-8868-DA4A-B373-5CEE19B53B52}"/>
+              </a:ext>
+            </a:extLst>
+          </p:cNvPr>
+          <p:cNvSpPr/>
+          <p:nvPr/>
+        </p:nvSpPr>
+        <p:spPr>
+          <a:xfrm>
+            <a:off x="10357981" y="3962400"/>
+            <a:ext cx="1295400" cy="533400"/>
+          </a:xfrm>
+          <a:prstGeom prst="rect">
+            <a:avLst/>
+          </a:prstGeom>
+          <a:solidFill>
+            <a:schemeClr val="bg1"/>
+          </a:solidFill>
+          <a:ln>
+            <a:solidFill>
+              <a:schemeClr val="tx1"/>
+            </a:solidFill>
+          </a:ln>
+          <a:effectLst/>
+        </p:spPr>
+        <p:style>
+          <a:lnRef idx="1">
+            <a:schemeClr val="accent1"/>
+          </a:lnRef>
+          <a:fillRef idx="3">
+            <a:schemeClr val="accent1"/>
+          </a:fillRef>
+          <a:effectRef idx="2">
+            <a:schemeClr val="accent1"/>
+          </a:effectRef>
+          <a:fontRef idx="minor">
+            <a:schemeClr val="lt1"/>
+          </a:fontRef>
+        </p:style>
+        <p:txBody>
+          <a:bodyPr rtlCol="0" anchor="ctr"/>
+          <a:lstStyle/>
+          <a:p>
+            <a:pPr algn="ctr"/>
+            <a:r>
+              <a:rPr lang="en-US" dirty="0" err="1">
+                <a:solidFill>
+                  <a:schemeClr val="tx1"/>
+                </a:solidFill>
+                <a:latin typeface="Open Sans"/>
+                <a:cs typeface="Open Sans"/>
+              </a:rPr>
+              <a:t>Man_invt</a:t>
+            </a:r>
+            <a:endParaRPr lang="en-US" dirty="0">
+              <a:solidFill>
+                <a:schemeClr val="tx1"/>
+              </a:solidFill>
+              <a:latin typeface="Open Sans"/>
+              <a:cs typeface="Open Sans"/>
+            </a:endParaRPr>
+          </a:p>
+        </p:txBody>
+      </p:sp>
+      <p:sp>
+        <p:nvSpPr>
+          <p:cNvPr id="6" name="Snip Single Corner Rectangle 5">
+            <a:extLst>
+              <a:ext uri="{FF2B5EF4-FFF2-40B4-BE49-F238E27FC236}">
+                <a16:creationId xmlns:a16="http://schemas.microsoft.com/office/drawing/2014/main" id="{66F7A30B-D1EC-224E-A341-04E00F04B94B}"/>
+              </a:ext>
+            </a:extLst>
+          </p:cNvPr>
+          <p:cNvSpPr/>
+          <p:nvPr/>
+        </p:nvSpPr>
+        <p:spPr>
+          <a:xfrm>
+            <a:off x="3429000" y="2514600"/>
+            <a:ext cx="1447800" cy="609600"/>
+          </a:xfrm>
+          <a:prstGeom prst="snip1Rect">
+            <a:avLst/>
+          </a:prstGeom>
+          <a:solidFill>
+            <a:schemeClr val="bg1"/>
+          </a:solidFill>
+          <a:ln>
+            <a:solidFill>
+              <a:schemeClr val="tx1"/>
+            </a:solidFill>
+          </a:ln>
+          <a:effectLst/>
+        </p:spPr>
+        <p:style>
+          <a:lnRef idx="1">
+            <a:schemeClr val="accent1"/>
+          </a:lnRef>
+          <a:fillRef idx="3">
+            <a:schemeClr val="accent1"/>
+          </a:fillRef>
+          <a:effectRef idx="2">
+            <a:schemeClr val="accent1"/>
+          </a:effectRef>
+          <a:fontRef idx="minor">
+            <a:schemeClr val="lt1"/>
+          </a:fontRef>
+        </p:style>
+        <p:txBody>
+          <a:bodyPr rtlCol="0" anchor="ctr"/>
+          <a:lstStyle/>
+          <a:p>
+            <a:pPr algn="ctr"/>
+            <a:r>
+              <a:rPr lang="en-US" dirty="0">
+                <a:solidFill>
+                  <a:schemeClr val="tx1"/>
+                </a:solidFill>
+                <a:latin typeface="Open Sans"/>
+                <a:cs typeface="Open Sans"/>
+              </a:rPr>
+              <a:t>Sub-packages</a:t>
+            </a:r>
+          </a:p>
+        </p:txBody>
+      </p:sp>
+      <p:sp>
+        <p:nvSpPr>
+          <p:cNvPr id="14" name="Snip Single Corner Rectangle 13">
+            <a:extLst>
+              <a:ext uri="{FF2B5EF4-FFF2-40B4-BE49-F238E27FC236}">
+                <a16:creationId xmlns:a16="http://schemas.microsoft.com/office/drawing/2014/main" id="{579D5FB0-11C9-5349-87B4-F6CDE107661F}"/>
+              </a:ext>
+            </a:extLst>
+          </p:cNvPr>
+          <p:cNvSpPr/>
+          <p:nvPr/>
+        </p:nvSpPr>
+        <p:spPr>
+          <a:xfrm>
+            <a:off x="3429000" y="3992062"/>
+            <a:ext cx="1447800" cy="609600"/>
+          </a:xfrm>
+          <a:prstGeom prst="snip1Rect">
+            <a:avLst/>
+          </a:prstGeom>
+          <a:solidFill>
+            <a:schemeClr val="bg1"/>
+          </a:solidFill>
+          <a:ln>
+            <a:solidFill>
+              <a:schemeClr val="tx1"/>
+            </a:solidFill>
+          </a:ln>
+          <a:effectLst/>
+        </p:spPr>
+        <p:style>
+          <a:lnRef idx="1">
+            <a:schemeClr val="accent1"/>
+          </a:lnRef>
+          <a:fillRef idx="3">
+            <a:schemeClr val="accent1"/>
+          </a:fillRef>
+          <a:effectRef idx="2">
+            <a:schemeClr val="accent1"/>
+          </a:effectRef>
+          <a:fontRef idx="minor">
+            <a:schemeClr val="lt1"/>
+          </a:fontRef>
+        </p:style>
+        <p:txBody>
+          <a:bodyPr rtlCol="0" anchor="ctr"/>
+          <a:lstStyle/>
+          <a:p>
+            <a:pPr algn="ctr"/>
+            <a:r>
+              <a:rPr lang="en-US" dirty="0">
+                <a:solidFill>
+                  <a:schemeClr val="tx1"/>
+                </a:solidFill>
+                <a:latin typeface="Open Sans"/>
+                <a:cs typeface="Open Sans"/>
+              </a:rPr>
+              <a:t>modules</a:t>
+            </a:r>
           </a:p>
         </p:txBody>
       </p:sp>

</xml_diff>